<commit_message>
add work of seminar
</commit_message>
<xml_diff>
--- a/School/seminar/User modeling full.pptx
+++ b/School/seminar/User modeling full.pptx
@@ -5,7 +5,7 @@
     <p:sldMasterId id="2147483660" r:id="rId1"/>
   </p:sldMasterIdLst>
   <p:handoutMasterIdLst>
-    <p:handoutMasterId r:id="rId19"/>
+    <p:handoutMasterId r:id="rId20"/>
   </p:handoutMasterIdLst>
   <p:sldIdLst>
     <p:sldId id="256" r:id="rId2"/>
@@ -23,8 +23,9 @@
     <p:sldId id="270" r:id="rId14"/>
     <p:sldId id="271" r:id="rId15"/>
     <p:sldId id="272" r:id="rId16"/>
-    <p:sldId id="259" r:id="rId17"/>
-    <p:sldId id="258" r:id="rId18"/>
+    <p:sldId id="273" r:id="rId17"/>
+    <p:sldId id="259" r:id="rId18"/>
+    <p:sldId id="258" r:id="rId19"/>
   </p:sldIdLst>
   <p:sldSz cx="9144000" cy="6858000" type="screen4x3"/>
   <p:notesSz cx="6669088" cy="9928225"/>
@@ -8509,6 +8510,216 @@
 </file>
 
 <file path=ppt/slides/slide16.xml><?xml version="1.0" encoding="utf-8"?>
+<p:sld xmlns:a="http://schemas.openxmlformats.org/drawingml/2006/main" xmlns:r="http://schemas.openxmlformats.org/officeDocument/2006/relationships" xmlns:p="http://schemas.openxmlformats.org/presentationml/2006/main">
+  <p:cSld>
+    <p:spTree>
+      <p:nvGrpSpPr>
+        <p:cNvPr id="1" name=""/>
+        <p:cNvGrpSpPr/>
+        <p:nvPr/>
+      </p:nvGrpSpPr>
+      <p:grpSpPr>
+        <a:xfrm>
+          <a:off x="0" y="0"/>
+          <a:ext cx="0" cy="0"/>
+          <a:chOff x="0" y="0"/>
+          <a:chExt cx="0" cy="0"/>
+        </a:xfrm>
+      </p:grpSpPr>
+      <p:sp>
+        <p:nvSpPr>
+          <p:cNvPr id="2" name="Title 1"/>
+          <p:cNvSpPr>
+            <a:spLocks noGrp="1"/>
+          </p:cNvSpPr>
+          <p:nvPr>
+            <p:ph type="title"/>
+          </p:nvPr>
+        </p:nvSpPr>
+        <p:spPr/>
+        <p:txBody>
+          <a:bodyPr/>
+          <a:lstStyle/>
+          <a:p>
+            <a:r>
+              <a:rPr lang="en-US" dirty="0" smtClean="0"/>
+              <a:t>bibliography</a:t>
+            </a:r>
+            <a:endParaRPr lang="en-US" dirty="0"/>
+          </a:p>
+        </p:txBody>
+      </p:sp>
+      <p:sp>
+        <p:nvSpPr>
+          <p:cNvPr id="3" name="Content Placeholder 2"/>
+          <p:cNvSpPr>
+            <a:spLocks noGrp="1"/>
+          </p:cNvSpPr>
+          <p:nvPr>
+            <p:ph idx="1"/>
+          </p:nvPr>
+        </p:nvSpPr>
+        <p:spPr/>
+        <p:txBody>
+          <a:bodyPr/>
+          <a:lstStyle/>
+          <a:p>
+            <a:r>
+              <a:rPr lang="en-US" dirty="0" smtClean="0"/>
+              <a:t>User </a:t>
+            </a:r>
+            <a:r>
+              <a:rPr lang="en-US" dirty="0" smtClean="0"/>
+              <a:t>Modeling: Recent </a:t>
+            </a:r>
+            <a:r>
+              <a:rPr lang="en-US" dirty="0" smtClean="0"/>
+              <a:t>Work, Prospects and </a:t>
+            </a:r>
+            <a:r>
+              <a:rPr lang="en-US" dirty="0" smtClean="0"/>
+              <a:t>Hazards1 – </a:t>
+            </a:r>
+            <a:r>
+              <a:rPr lang="en-US" sz="2400" dirty="0" err="1" smtClean="0"/>
+              <a:t>alfred</a:t>
+            </a:r>
+            <a:r>
+              <a:rPr lang="en-US" sz="2400" dirty="0" smtClean="0"/>
+              <a:t> </a:t>
+            </a:r>
+            <a:r>
+              <a:rPr lang="en-US" sz="2400" dirty="0" err="1" smtClean="0"/>
+              <a:t>kobsa</a:t>
+            </a:r>
+            <a:r>
+              <a:rPr lang="en-US" sz="2400" dirty="0" smtClean="0"/>
+              <a:t>.</a:t>
+            </a:r>
+            <a:endParaRPr lang="en-US" dirty="0" smtClean="0"/>
+          </a:p>
+          <a:p>
+            <a:r>
+              <a:rPr lang="en-US" dirty="0" smtClean="0"/>
+              <a:t>The User Modeling Shell System </a:t>
+            </a:r>
+            <a:r>
+              <a:rPr lang="en-US" dirty="0" smtClean="0"/>
+              <a:t>BGP-MS - </a:t>
+            </a:r>
+            <a:r>
+              <a:rPr lang="en-US" sz="2400" dirty="0" smtClean="0"/>
+              <a:t>Alfred </a:t>
+            </a:r>
+            <a:r>
+              <a:rPr lang="en-US" sz="2400" dirty="0" err="1" smtClean="0"/>
+              <a:t>Kobsa</a:t>
+            </a:r>
+            <a:r>
+              <a:rPr lang="en-US" sz="2400" dirty="0" smtClean="0"/>
+              <a:t> and Wolfgang </a:t>
+            </a:r>
+            <a:r>
+              <a:rPr lang="en-US" sz="2400" dirty="0" smtClean="0"/>
+              <a:t>Pohl</a:t>
+            </a:r>
+            <a:endParaRPr lang="en-US" dirty="0" smtClean="0"/>
+          </a:p>
+          <a:p>
+            <a:r>
+              <a:rPr lang="en-US" dirty="0" smtClean="0"/>
+              <a:t>User Modeling in Adaptive Hypermedia Educational </a:t>
+            </a:r>
+            <a:r>
+              <a:rPr lang="en-US" dirty="0" smtClean="0"/>
+              <a:t>Systems - </a:t>
+            </a:r>
+            <a:r>
+              <a:rPr lang="pt-BR" sz="2400" dirty="0" smtClean="0"/>
+              <a:t>António Constantino Martins, </a:t>
+            </a:r>
+            <a:r>
+              <a:rPr lang="pt-BR" sz="2400" dirty="0" err="1" smtClean="0"/>
+              <a:t>Luíz</a:t>
+            </a:r>
+            <a:r>
+              <a:rPr lang="pt-BR" sz="2400" dirty="0" smtClean="0"/>
+              <a:t> </a:t>
+            </a:r>
+            <a:r>
+              <a:rPr lang="pt-BR" sz="2400" dirty="0" smtClean="0"/>
+              <a:t>Faria,</a:t>
+            </a:r>
+            <a:r>
+              <a:rPr lang="en-US" sz="2400" dirty="0" smtClean="0"/>
+              <a:t> Carlos </a:t>
+            </a:r>
+            <a:r>
+              <a:rPr lang="en-US" sz="2400" dirty="0" err="1" smtClean="0"/>
+              <a:t>Vaz</a:t>
+            </a:r>
+            <a:r>
+              <a:rPr lang="en-US" sz="2400" dirty="0" smtClean="0"/>
+              <a:t> de </a:t>
+            </a:r>
+            <a:r>
+              <a:rPr lang="en-US" sz="2400" dirty="0" err="1" smtClean="0"/>
+              <a:t>Carvalho</a:t>
+            </a:r>
+            <a:r>
+              <a:rPr lang="en-US" sz="2400" dirty="0" smtClean="0"/>
+              <a:t>,</a:t>
+            </a:r>
+            <a:r>
+              <a:rPr lang="en-US" b="1" dirty="0" smtClean="0"/>
+              <a:t> </a:t>
+            </a:r>
+            <a:r>
+              <a:rPr lang="en-US" sz="2000" dirty="0" err="1" smtClean="0"/>
+              <a:t>Eurico</a:t>
+            </a:r>
+            <a:r>
+              <a:rPr lang="en-US" sz="2000" dirty="0" smtClean="0"/>
+              <a:t> </a:t>
+            </a:r>
+            <a:r>
+              <a:rPr lang="en-US" sz="2000" dirty="0" err="1" smtClean="0"/>
+              <a:t>Carrapatoso</a:t>
+            </a:r>
+            <a:endParaRPr lang="pt-BR" dirty="0" smtClean="0"/>
+          </a:p>
+          <a:p>
+            <a:r>
+              <a:rPr lang="en-US" dirty="0" smtClean="0"/>
+              <a:t>User Modeling in Adaptive </a:t>
+            </a:r>
+            <a:r>
+              <a:rPr lang="en-US" dirty="0" smtClean="0"/>
+              <a:t>Interfaces- </a:t>
+            </a:r>
+            <a:r>
+              <a:rPr lang="en-US" sz="2400" smtClean="0"/>
+              <a:t>Pat </a:t>
+            </a:r>
+            <a:r>
+              <a:rPr lang="en-US" sz="2400" smtClean="0"/>
+              <a:t>Langley</a:t>
+            </a:r>
+          </a:p>
+          <a:p>
+            <a:endParaRPr lang="en-US" dirty="0"/>
+          </a:p>
+        </p:txBody>
+      </p:sp>
+    </p:spTree>
+  </p:cSld>
+  <p:clrMapOvr>
+    <a:masterClrMapping/>
+  </p:clrMapOvr>
+</p:sld>
+</file>
+
+<file path=ppt/slides/slide17.xml><?xml version="1.0" encoding="utf-8"?>
 <p:sld xmlns:a="http://schemas.openxmlformats.org/drawingml/2006/main" xmlns:r="http://schemas.openxmlformats.org/officeDocument/2006/relationships" xmlns:p="http://schemas.openxmlformats.org/presentationml/2006/main" show="0">
   <p:cSld>
     <p:spTree>
@@ -8603,8 +8814,8 @@
 </p:sld>
 </file>
 
-<file path=ppt/slides/slide17.xml><?xml version="1.0" encoding="utf-8"?>
-<p:sld xmlns:a="http://schemas.openxmlformats.org/drawingml/2006/main" xmlns:r="http://schemas.openxmlformats.org/officeDocument/2006/relationships" xmlns:p="http://schemas.openxmlformats.org/presentationml/2006/main">
+<file path=ppt/slides/slide18.xml><?xml version="1.0" encoding="utf-8"?>
+<p:sld xmlns:a="http://schemas.openxmlformats.org/drawingml/2006/main" xmlns:r="http://schemas.openxmlformats.org/officeDocument/2006/relationships" xmlns:p="http://schemas.openxmlformats.org/presentationml/2006/main" show="0">
   <p:cSld>
     <p:spTree>
       <p:nvGrpSpPr>
@@ -8686,6 +8897,7 @@
   <p:clrMapOvr>
     <a:masterClrMapping/>
   </p:clrMapOvr>
+  <p:transition/>
   <p:timing>
     <p:tnLst>
       <p:par>

</xml_diff>